<commit_message>
Corrections in all jupyter notebooks
</commit_message>
<xml_diff>
--- a/deep-learning-in-practice-with-pytorch/1-remarks-on-neural-networks.pptx
+++ b/deep-learning-in-practice-with-pytorch/1-remarks-on-neural-networks.pptx
@@ -220,7 +220,7 @@
           <a:p>
             <a:fld id="{1E63C81F-2B0A-4AE9-9609-6E327A871E86}" type="datetimeFigureOut">
               <a:rPr lang="en-US" smtClean="0"/>
-              <a:t>4/8/2024</a:t>
+              <a:t>4/14/2024</a:t>
             </a:fld>
             <a:endParaRPr lang="en-US"/>
           </a:p>
@@ -940,7 +940,7 @@
           <p:nvPr userDrawn="1"/>
         </p:nvPicPr>
         <p:blipFill rotWithShape="1">
-          <a:blip r:embed="rId6">
+          <a:blip r:embed="rId6" cstate="print">
             <a:extLst>
               <a:ext uri="{BEBA8EAE-BF5A-486C-A8C5-ECC9F3942E4B}">
                 <a14:imgProps xmlns:a14="http://schemas.microsoft.com/office/drawing/2010/main">
@@ -994,7 +994,13 @@
           <p:nvPr userDrawn="1"/>
         </p:nvPicPr>
         <p:blipFill>
-          <a:blip r:embed="rId8"/>
+          <a:blip r:embed="rId8">
+            <a:extLst>
+              <a:ext uri="{28A0092B-C50C-407E-A947-70E740481C1C}">
+                <a14:useLocalDpi xmlns:a14="http://schemas.microsoft.com/office/drawing/2010/main" val="0"/>
+              </a:ext>
+            </a:extLst>
+          </a:blip>
           <a:stretch>
             <a:fillRect/>
           </a:stretch>
@@ -1394,7 +1400,7 @@
           <p:nvPr userDrawn="1"/>
         </p:nvPicPr>
         <p:blipFill rotWithShape="1">
-          <a:blip r:embed="rId6">
+          <a:blip r:embed="rId6" cstate="print">
             <a:extLst>
               <a:ext uri="{BEBA8EAE-BF5A-486C-A8C5-ECC9F3942E4B}">
                 <a14:imgProps xmlns:a14="http://schemas.microsoft.com/office/drawing/2010/main">
@@ -1448,7 +1454,13 @@
           <p:nvPr userDrawn="1"/>
         </p:nvPicPr>
         <p:blipFill>
-          <a:blip r:embed="rId8"/>
+          <a:blip r:embed="rId8">
+            <a:extLst>
+              <a:ext uri="{28A0092B-C50C-407E-A947-70E740481C1C}">
+                <a14:useLocalDpi xmlns:a14="http://schemas.microsoft.com/office/drawing/2010/main" val="0"/>
+              </a:ext>
+            </a:extLst>
+          </a:blip>
           <a:stretch>
             <a:fillRect/>
           </a:stretch>
@@ -5807,7 +5819,7 @@
               </a:ext>
             </a:extLst>
           </a:blip>
-          <a:srcRect l="28439" t="33225" r="19588" b="25170"/>
+          <a:srcRect/>
           <a:stretch/>
         </p:blipFill>
         <p:spPr bwMode="auto">
@@ -6852,7 +6864,13 @@
           <p:nvPr/>
         </p:nvPicPr>
         <p:blipFill>
-          <a:blip r:embed="rId2"/>
+          <a:blip r:embed="rId2">
+            <a:extLst>
+              <a:ext uri="{28A0092B-C50C-407E-A947-70E740481C1C}">
+                <a14:useLocalDpi xmlns:a14="http://schemas.microsoft.com/office/drawing/2010/main" val="0"/>
+              </a:ext>
+            </a:extLst>
+          </a:blip>
           <a:stretch>
             <a:fillRect/>
           </a:stretch>

</xml_diff>